<commit_message>
kafka 브로커 2개 추가, kafka-worker 용 pod 생성
</commit_message>
<xml_diff>
--- a/db2db_구조.pptx
+++ b/db2db_구조.pptx
@@ -6,9 +6,12 @@
   </p:sldMasterIdLst>
   <p:sldIdLst>
     <p:sldId id="256" r:id="rId2"/>
-    <p:sldId id="257" r:id="rId3"/>
-    <p:sldId id="258" r:id="rId4"/>
-    <p:sldId id="259" r:id="rId5"/>
+    <p:sldId id="260" r:id="rId3"/>
+    <p:sldId id="261" r:id="rId4"/>
+    <p:sldId id="257" r:id="rId5"/>
+    <p:sldId id="262" r:id="rId6"/>
+    <p:sldId id="258" r:id="rId7"/>
+    <p:sldId id="259" r:id="rId8"/>
   </p:sldIdLst>
   <p:sldSz cx="12192000" cy="6858000"/>
   <p:notesSz cx="6858000" cy="9144000"/>
@@ -246,7 +249,7 @@
           <a:p>
             <a:fld id="{810557F9-1F21-47B8-A6D4-D5A2F4A22EB4}" type="datetimeFigureOut">
               <a:rPr lang="ko-KR" altLang="en-US" smtClean="0"/>
-              <a:t>2020-02-27</a:t>
+              <a:t>2020-02-28</a:t>
             </a:fld>
             <a:endParaRPr lang="ko-KR" altLang="en-US"/>
           </a:p>
@@ -416,7 +419,7 @@
           <a:p>
             <a:fld id="{810557F9-1F21-47B8-A6D4-D5A2F4A22EB4}" type="datetimeFigureOut">
               <a:rPr lang="ko-KR" altLang="en-US" smtClean="0"/>
-              <a:t>2020-02-27</a:t>
+              <a:t>2020-02-28</a:t>
             </a:fld>
             <a:endParaRPr lang="ko-KR" altLang="en-US"/>
           </a:p>
@@ -596,7 +599,7 @@
           <a:p>
             <a:fld id="{810557F9-1F21-47B8-A6D4-D5A2F4A22EB4}" type="datetimeFigureOut">
               <a:rPr lang="ko-KR" altLang="en-US" smtClean="0"/>
-              <a:t>2020-02-27</a:t>
+              <a:t>2020-02-28</a:t>
             </a:fld>
             <a:endParaRPr lang="ko-KR" altLang="en-US"/>
           </a:p>
@@ -766,7 +769,7 @@
           <a:p>
             <a:fld id="{810557F9-1F21-47B8-A6D4-D5A2F4A22EB4}" type="datetimeFigureOut">
               <a:rPr lang="ko-KR" altLang="en-US" smtClean="0"/>
-              <a:t>2020-02-27</a:t>
+              <a:t>2020-02-28</a:t>
             </a:fld>
             <a:endParaRPr lang="ko-KR" altLang="en-US"/>
           </a:p>
@@ -1012,7 +1015,7 @@
           <a:p>
             <a:fld id="{810557F9-1F21-47B8-A6D4-D5A2F4A22EB4}" type="datetimeFigureOut">
               <a:rPr lang="ko-KR" altLang="en-US" smtClean="0"/>
-              <a:t>2020-02-27</a:t>
+              <a:t>2020-02-28</a:t>
             </a:fld>
             <a:endParaRPr lang="ko-KR" altLang="en-US"/>
           </a:p>
@@ -1244,7 +1247,7 @@
           <a:p>
             <a:fld id="{810557F9-1F21-47B8-A6D4-D5A2F4A22EB4}" type="datetimeFigureOut">
               <a:rPr lang="ko-KR" altLang="en-US" smtClean="0"/>
-              <a:t>2020-02-27</a:t>
+              <a:t>2020-02-28</a:t>
             </a:fld>
             <a:endParaRPr lang="ko-KR" altLang="en-US"/>
           </a:p>
@@ -1611,7 +1614,7 @@
           <a:p>
             <a:fld id="{810557F9-1F21-47B8-A6D4-D5A2F4A22EB4}" type="datetimeFigureOut">
               <a:rPr lang="ko-KR" altLang="en-US" smtClean="0"/>
-              <a:t>2020-02-27</a:t>
+              <a:t>2020-02-28</a:t>
             </a:fld>
             <a:endParaRPr lang="ko-KR" altLang="en-US"/>
           </a:p>
@@ -1729,7 +1732,7 @@
           <a:p>
             <a:fld id="{810557F9-1F21-47B8-A6D4-D5A2F4A22EB4}" type="datetimeFigureOut">
               <a:rPr lang="ko-KR" altLang="en-US" smtClean="0"/>
-              <a:t>2020-02-27</a:t>
+              <a:t>2020-02-28</a:t>
             </a:fld>
             <a:endParaRPr lang="ko-KR" altLang="en-US"/>
           </a:p>
@@ -1824,7 +1827,7 @@
           <a:p>
             <a:fld id="{810557F9-1F21-47B8-A6D4-D5A2F4A22EB4}" type="datetimeFigureOut">
               <a:rPr lang="ko-KR" altLang="en-US" smtClean="0"/>
-              <a:t>2020-02-27</a:t>
+              <a:t>2020-02-28</a:t>
             </a:fld>
             <a:endParaRPr lang="ko-KR" altLang="en-US"/>
           </a:p>
@@ -2101,7 +2104,7 @@
           <a:p>
             <a:fld id="{810557F9-1F21-47B8-A6D4-D5A2F4A22EB4}" type="datetimeFigureOut">
               <a:rPr lang="ko-KR" altLang="en-US" smtClean="0"/>
-              <a:t>2020-02-27</a:t>
+              <a:t>2020-02-28</a:t>
             </a:fld>
             <a:endParaRPr lang="ko-KR" altLang="en-US"/>
           </a:p>
@@ -2354,7 +2357,7 @@
           <a:p>
             <a:fld id="{810557F9-1F21-47B8-A6D4-D5A2F4A22EB4}" type="datetimeFigureOut">
               <a:rPr lang="ko-KR" altLang="en-US" smtClean="0"/>
-              <a:t>2020-02-27</a:t>
+              <a:t>2020-02-28</a:t>
             </a:fld>
             <a:endParaRPr lang="ko-KR" altLang="en-US"/>
           </a:p>
@@ -2567,7 +2570,7 @@
           <a:p>
             <a:fld id="{810557F9-1F21-47B8-A6D4-D5A2F4A22EB4}" type="datetimeFigureOut">
               <a:rPr lang="ko-KR" altLang="en-US" smtClean="0"/>
-              <a:t>2020-02-27</a:t>
+              <a:t>2020-02-28</a:t>
             </a:fld>
             <a:endParaRPr lang="ko-KR" altLang="en-US"/>
           </a:p>
@@ -3061,6 +3064,1797 @@
             <p:ph type="title"/>
           </p:nvPr>
         </p:nvSpPr>
+        <p:spPr>
+          <a:xfrm>
+            <a:off x="838200" y="365126"/>
+            <a:ext cx="10515600" cy="740468"/>
+          </a:xfrm>
+        </p:spPr>
+        <p:txBody>
+          <a:bodyPr>
+            <a:normAutofit/>
+          </a:bodyPr>
+          <a:lstStyle/>
+          <a:p>
+            <a:r>
+              <a:rPr lang="en-US" altLang="ko-KR" sz="3200" smtClean="0"/>
+              <a:t>Source </a:t>
+            </a:r>
+            <a:r>
+              <a:rPr lang="ko-KR" altLang="en-US" sz="3200" smtClean="0"/>
+              <a:t>방식</a:t>
+            </a:r>
+            <a:endParaRPr lang="ko-KR" altLang="en-US" sz="3200"/>
+          </a:p>
+        </p:txBody>
+      </p:sp>
+      <p:graphicFrame>
+        <p:nvGraphicFramePr>
+          <p:cNvPr id="4" name="내용 개체 틀 3"/>
+          <p:cNvGraphicFramePr>
+            <a:graphicFrameLocks noGrp="1"/>
+          </p:cNvGraphicFramePr>
+          <p:nvPr>
+            <p:ph idx="1"/>
+            <p:extLst>
+              <p:ext uri="{D42A27DB-BD31-4B8C-83A1-F6EECF244321}">
+                <p14:modId xmlns:p14="http://schemas.microsoft.com/office/powerpoint/2010/main" val="980686499"/>
+              </p:ext>
+            </p:extLst>
+          </p:nvPr>
+        </p:nvGraphicFramePr>
+        <p:xfrm>
+          <a:off x="838200" y="1105594"/>
+          <a:ext cx="10515600" cy="1854200"/>
+        </p:xfrm>
+        <a:graphic>
+          <a:graphicData uri="http://schemas.openxmlformats.org/drawingml/2006/table">
+            <a:tbl>
+              <a:tblPr firstRow="1" bandRow="1">
+                <a:tableStyleId>{5C22544A-7EE6-4342-B048-85BDC9FD1C3A}</a:tableStyleId>
+              </a:tblPr>
+              <a:tblGrid>
+                <a:gridCol w="2628900">
+                  <a:extLst>
+                    <a:ext uri="{9D8B030D-6E8A-4147-A177-3AD203B41FA5}">
+                      <a16:colId xmlns:a16="http://schemas.microsoft.com/office/drawing/2014/main" val="1069818955"/>
+                    </a:ext>
+                  </a:extLst>
+                </a:gridCol>
+                <a:gridCol w="2628900">
+                  <a:extLst>
+                    <a:ext uri="{9D8B030D-6E8A-4147-A177-3AD203B41FA5}">
+                      <a16:colId xmlns:a16="http://schemas.microsoft.com/office/drawing/2014/main" val="1273292154"/>
+                    </a:ext>
+                  </a:extLst>
+                </a:gridCol>
+                <a:gridCol w="2628900">
+                  <a:extLst>
+                    <a:ext uri="{9D8B030D-6E8A-4147-A177-3AD203B41FA5}">
+                      <a16:colId xmlns:a16="http://schemas.microsoft.com/office/drawing/2014/main" val="1458604096"/>
+                    </a:ext>
+                  </a:extLst>
+                </a:gridCol>
+                <a:gridCol w="2628900">
+                  <a:extLst>
+                    <a:ext uri="{9D8B030D-6E8A-4147-A177-3AD203B41FA5}">
+                      <a16:colId xmlns:a16="http://schemas.microsoft.com/office/drawing/2014/main" val="1544027677"/>
+                    </a:ext>
+                  </a:extLst>
+                </a:gridCol>
+              </a:tblGrid>
+              <a:tr h="370840">
+                <a:tc>
+                  <a:txBody>
+                    <a:bodyPr/>
+                    <a:lstStyle/>
+                    <a:p>
+                      <a:pPr latinLnBrk="1"/>
+                      <a:endParaRPr lang="ko-KR" altLang="en-US"/>
+                    </a:p>
+                  </a:txBody>
+                  <a:tcPr/>
+                </a:tc>
+                <a:tc>
+                  <a:txBody>
+                    <a:bodyPr/>
+                    <a:lstStyle/>
+                    <a:p>
+                      <a:pPr latinLnBrk="1"/>
+                      <a:r>
+                        <a:rPr lang="en-US" altLang="ko-KR" smtClean="0"/>
+                        <a:t>NiFi JDBC</a:t>
+                      </a:r>
+                      <a:endParaRPr lang="ko-KR" altLang="en-US"/>
+                    </a:p>
+                  </a:txBody>
+                  <a:tcPr/>
+                </a:tc>
+                <a:tc>
+                  <a:txBody>
+                    <a:bodyPr/>
+                    <a:lstStyle/>
+                    <a:p>
+                      <a:pPr latinLnBrk="1"/>
+                      <a:r>
+                        <a:rPr lang="en-US" altLang="ko-KR" smtClean="0"/>
+                        <a:t>Kafka Connect JDBC</a:t>
+                      </a:r>
+                      <a:endParaRPr lang="ko-KR" altLang="en-US"/>
+                    </a:p>
+                  </a:txBody>
+                  <a:tcPr/>
+                </a:tc>
+                <a:tc>
+                  <a:txBody>
+                    <a:bodyPr/>
+                    <a:lstStyle/>
+                    <a:p>
+                      <a:pPr latinLnBrk="1"/>
+                      <a:r>
+                        <a:rPr lang="en-US" altLang="ko-KR" smtClean="0"/>
+                        <a:t>Kafka Connect OGG</a:t>
+                      </a:r>
+                      <a:endParaRPr lang="ko-KR" altLang="en-US"/>
+                    </a:p>
+                  </a:txBody>
+                  <a:tcPr/>
+                </a:tc>
+                <a:extLst>
+                  <a:ext uri="{0D108BD9-81ED-4DB2-BD59-A6C34878D82A}">
+                    <a16:rowId xmlns:a16="http://schemas.microsoft.com/office/drawing/2014/main" val="3399521912"/>
+                  </a:ext>
+                </a:extLst>
+              </a:tr>
+              <a:tr h="370840">
+                <a:tc>
+                  <a:txBody>
+                    <a:bodyPr/>
+                    <a:lstStyle/>
+                    <a:p>
+                      <a:pPr latinLnBrk="1"/>
+                      <a:r>
+                        <a:rPr lang="ko-KR" altLang="en-US" smtClean="0"/>
+                        <a:t>수집방식</a:t>
+                      </a:r>
+                      <a:endParaRPr lang="ko-KR" altLang="en-US"/>
+                    </a:p>
+                  </a:txBody>
+                  <a:tcPr/>
+                </a:tc>
+                <a:tc>
+                  <a:txBody>
+                    <a:bodyPr/>
+                    <a:lstStyle/>
+                    <a:p>
+                      <a:pPr latinLnBrk="1"/>
+                      <a:r>
+                        <a:rPr lang="ko-KR" altLang="en-US" smtClean="0"/>
+                        <a:t>증분 </a:t>
+                      </a:r>
+                      <a:r>
+                        <a:rPr lang="en-US" altLang="ko-KR" smtClean="0"/>
+                        <a:t>Select</a:t>
+                      </a:r>
+                      <a:endParaRPr lang="ko-KR" altLang="en-US"/>
+                    </a:p>
+                  </a:txBody>
+                  <a:tcPr/>
+                </a:tc>
+                <a:tc>
+                  <a:txBody>
+                    <a:bodyPr/>
+                    <a:lstStyle/>
+                    <a:p>
+                      <a:pPr latinLnBrk="1"/>
+                      <a:r>
+                        <a:rPr lang="ko-KR" altLang="en-US" smtClean="0"/>
+                        <a:t>증분 </a:t>
+                      </a:r>
+                      <a:r>
+                        <a:rPr lang="en-US" altLang="ko-KR" smtClean="0"/>
+                        <a:t>Select</a:t>
+                      </a:r>
+                      <a:endParaRPr lang="ko-KR" altLang="en-US"/>
+                    </a:p>
+                  </a:txBody>
+                  <a:tcPr/>
+                </a:tc>
+                <a:tc>
+                  <a:txBody>
+                    <a:bodyPr/>
+                    <a:lstStyle/>
+                    <a:p>
+                      <a:pPr latinLnBrk="1"/>
+                      <a:r>
+                        <a:rPr lang="en-US" altLang="ko-KR" smtClean="0"/>
+                        <a:t>CDC</a:t>
+                      </a:r>
+                      <a:endParaRPr lang="ko-KR" altLang="en-US"/>
+                    </a:p>
+                  </a:txBody>
+                  <a:tcPr/>
+                </a:tc>
+                <a:extLst>
+                  <a:ext uri="{0D108BD9-81ED-4DB2-BD59-A6C34878D82A}">
+                    <a16:rowId xmlns:a16="http://schemas.microsoft.com/office/drawing/2014/main" val="3380113062"/>
+                  </a:ext>
+                </a:extLst>
+              </a:tr>
+              <a:tr h="370840">
+                <a:tc>
+                  <a:txBody>
+                    <a:bodyPr/>
+                    <a:lstStyle/>
+                    <a:p>
+                      <a:pPr latinLnBrk="1"/>
+                      <a:endParaRPr lang="ko-KR" altLang="en-US"/>
+                    </a:p>
+                  </a:txBody>
+                  <a:tcPr/>
+                </a:tc>
+                <a:tc>
+                  <a:txBody>
+                    <a:bodyPr/>
+                    <a:lstStyle/>
+                    <a:p>
+                      <a:pPr latinLnBrk="1"/>
+                      <a:endParaRPr lang="ko-KR" altLang="en-US"/>
+                    </a:p>
+                  </a:txBody>
+                  <a:tcPr/>
+                </a:tc>
+                <a:tc>
+                  <a:txBody>
+                    <a:bodyPr/>
+                    <a:lstStyle/>
+                    <a:p>
+                      <a:pPr latinLnBrk="1"/>
+                      <a:endParaRPr lang="ko-KR" altLang="en-US"/>
+                    </a:p>
+                  </a:txBody>
+                  <a:tcPr/>
+                </a:tc>
+                <a:tc>
+                  <a:txBody>
+                    <a:bodyPr/>
+                    <a:lstStyle/>
+                    <a:p>
+                      <a:pPr latinLnBrk="1"/>
+                      <a:endParaRPr lang="ko-KR" altLang="en-US"/>
+                    </a:p>
+                  </a:txBody>
+                  <a:tcPr/>
+                </a:tc>
+                <a:extLst>
+                  <a:ext uri="{0D108BD9-81ED-4DB2-BD59-A6C34878D82A}">
+                    <a16:rowId xmlns:a16="http://schemas.microsoft.com/office/drawing/2014/main" val="1933756291"/>
+                  </a:ext>
+                </a:extLst>
+              </a:tr>
+              <a:tr h="370840">
+                <a:tc>
+                  <a:txBody>
+                    <a:bodyPr/>
+                    <a:lstStyle/>
+                    <a:p>
+                      <a:pPr latinLnBrk="1"/>
+                      <a:endParaRPr lang="ko-KR" altLang="en-US"/>
+                    </a:p>
+                  </a:txBody>
+                  <a:tcPr/>
+                </a:tc>
+                <a:tc>
+                  <a:txBody>
+                    <a:bodyPr/>
+                    <a:lstStyle/>
+                    <a:p>
+                      <a:pPr latinLnBrk="1"/>
+                      <a:endParaRPr lang="ko-KR" altLang="en-US"/>
+                    </a:p>
+                  </a:txBody>
+                  <a:tcPr/>
+                </a:tc>
+                <a:tc>
+                  <a:txBody>
+                    <a:bodyPr/>
+                    <a:lstStyle/>
+                    <a:p>
+                      <a:pPr latinLnBrk="1"/>
+                      <a:endParaRPr lang="ko-KR" altLang="en-US"/>
+                    </a:p>
+                  </a:txBody>
+                  <a:tcPr/>
+                </a:tc>
+                <a:tc>
+                  <a:txBody>
+                    <a:bodyPr/>
+                    <a:lstStyle/>
+                    <a:p>
+                      <a:pPr latinLnBrk="1"/>
+                      <a:endParaRPr lang="ko-KR" altLang="en-US"/>
+                    </a:p>
+                  </a:txBody>
+                  <a:tcPr/>
+                </a:tc>
+                <a:extLst>
+                  <a:ext uri="{0D108BD9-81ED-4DB2-BD59-A6C34878D82A}">
+                    <a16:rowId xmlns:a16="http://schemas.microsoft.com/office/drawing/2014/main" val="2900750693"/>
+                  </a:ext>
+                </a:extLst>
+              </a:tr>
+              <a:tr h="370840">
+                <a:tc>
+                  <a:txBody>
+                    <a:bodyPr/>
+                    <a:lstStyle/>
+                    <a:p>
+                      <a:pPr latinLnBrk="1"/>
+                      <a:endParaRPr lang="ko-KR" altLang="en-US"/>
+                    </a:p>
+                  </a:txBody>
+                  <a:tcPr/>
+                </a:tc>
+                <a:tc>
+                  <a:txBody>
+                    <a:bodyPr/>
+                    <a:lstStyle/>
+                    <a:p>
+                      <a:pPr latinLnBrk="1"/>
+                      <a:endParaRPr lang="ko-KR" altLang="en-US"/>
+                    </a:p>
+                  </a:txBody>
+                  <a:tcPr/>
+                </a:tc>
+                <a:tc>
+                  <a:txBody>
+                    <a:bodyPr/>
+                    <a:lstStyle/>
+                    <a:p>
+                      <a:pPr latinLnBrk="1"/>
+                      <a:endParaRPr lang="ko-KR" altLang="en-US"/>
+                    </a:p>
+                  </a:txBody>
+                  <a:tcPr/>
+                </a:tc>
+                <a:tc>
+                  <a:txBody>
+                    <a:bodyPr/>
+                    <a:lstStyle/>
+                    <a:p>
+                      <a:pPr latinLnBrk="1"/>
+                      <a:endParaRPr lang="en-US" altLang="ko-KR" smtClean="0"/>
+                    </a:p>
+                  </a:txBody>
+                  <a:tcPr/>
+                </a:tc>
+                <a:extLst>
+                  <a:ext uri="{0D108BD9-81ED-4DB2-BD59-A6C34878D82A}">
+                    <a16:rowId xmlns:a16="http://schemas.microsoft.com/office/drawing/2014/main" val="1979977662"/>
+                  </a:ext>
+                </a:extLst>
+              </a:tr>
+            </a:tbl>
+          </a:graphicData>
+        </a:graphic>
+      </p:graphicFrame>
+      <p:graphicFrame>
+        <p:nvGraphicFramePr>
+          <p:cNvPr id="5" name="내용 개체 틀 3"/>
+          <p:cNvGraphicFramePr>
+            <a:graphicFrameLocks/>
+          </p:cNvGraphicFramePr>
+          <p:nvPr>
+            <p:extLst>
+              <p:ext uri="{D42A27DB-BD31-4B8C-83A1-F6EECF244321}">
+                <p14:modId xmlns:p14="http://schemas.microsoft.com/office/powerpoint/2010/main" val="2220457622"/>
+              </p:ext>
+            </p:extLst>
+          </p:nvPr>
+        </p:nvGraphicFramePr>
+        <p:xfrm>
+          <a:off x="838200" y="4078374"/>
+          <a:ext cx="10515600" cy="1854200"/>
+        </p:xfrm>
+        <a:graphic>
+          <a:graphicData uri="http://schemas.openxmlformats.org/drawingml/2006/table">
+            <a:tbl>
+              <a:tblPr firstRow="1" bandRow="1">
+                <a:tableStyleId>{5C22544A-7EE6-4342-B048-85BDC9FD1C3A}</a:tableStyleId>
+              </a:tblPr>
+              <a:tblGrid>
+                <a:gridCol w="2628900">
+                  <a:extLst>
+                    <a:ext uri="{9D8B030D-6E8A-4147-A177-3AD203B41FA5}">
+                      <a16:colId xmlns:a16="http://schemas.microsoft.com/office/drawing/2014/main" val="1069818955"/>
+                    </a:ext>
+                  </a:extLst>
+                </a:gridCol>
+                <a:gridCol w="2628900">
+                  <a:extLst>
+                    <a:ext uri="{9D8B030D-6E8A-4147-A177-3AD203B41FA5}">
+                      <a16:colId xmlns:a16="http://schemas.microsoft.com/office/drawing/2014/main" val="1273292154"/>
+                    </a:ext>
+                  </a:extLst>
+                </a:gridCol>
+                <a:gridCol w="2628900">
+                  <a:extLst>
+                    <a:ext uri="{9D8B030D-6E8A-4147-A177-3AD203B41FA5}">
+                      <a16:colId xmlns:a16="http://schemas.microsoft.com/office/drawing/2014/main" val="1458604096"/>
+                    </a:ext>
+                  </a:extLst>
+                </a:gridCol>
+                <a:gridCol w="2628900">
+                  <a:extLst>
+                    <a:ext uri="{9D8B030D-6E8A-4147-A177-3AD203B41FA5}">
+                      <a16:colId xmlns:a16="http://schemas.microsoft.com/office/drawing/2014/main" val="1544027677"/>
+                    </a:ext>
+                  </a:extLst>
+                </a:gridCol>
+              </a:tblGrid>
+              <a:tr h="370840">
+                <a:tc>
+                  <a:txBody>
+                    <a:bodyPr/>
+                    <a:lstStyle/>
+                    <a:p>
+                      <a:pPr latinLnBrk="1"/>
+                      <a:endParaRPr lang="ko-KR" altLang="en-US"/>
+                    </a:p>
+                  </a:txBody>
+                  <a:tcPr/>
+                </a:tc>
+                <a:tc>
+                  <a:txBody>
+                    <a:bodyPr/>
+                    <a:lstStyle/>
+                    <a:p>
+                      <a:pPr latinLnBrk="1"/>
+                      <a:r>
+                        <a:rPr lang="en-US" altLang="ko-KR" smtClean="0"/>
+                        <a:t>NiFi JDBC</a:t>
+                      </a:r>
+                      <a:endParaRPr lang="ko-KR" altLang="en-US"/>
+                    </a:p>
+                  </a:txBody>
+                  <a:tcPr/>
+                </a:tc>
+                <a:tc>
+                  <a:txBody>
+                    <a:bodyPr/>
+                    <a:lstStyle/>
+                    <a:p>
+                      <a:pPr latinLnBrk="1"/>
+                      <a:r>
+                        <a:rPr lang="en-US" altLang="ko-KR" smtClean="0"/>
+                        <a:t>Kafka Connect JDBC</a:t>
+                      </a:r>
+                      <a:endParaRPr lang="ko-KR" altLang="en-US"/>
+                    </a:p>
+                  </a:txBody>
+                  <a:tcPr/>
+                </a:tc>
+                <a:tc>
+                  <a:txBody>
+                    <a:bodyPr/>
+                    <a:lstStyle/>
+                    <a:p>
+                      <a:pPr latinLnBrk="1"/>
+                      <a:r>
+                        <a:rPr lang="en-US" altLang="ko-KR" smtClean="0"/>
+                        <a:t>Kafka Connect OGG</a:t>
+                      </a:r>
+                      <a:endParaRPr lang="ko-KR" altLang="en-US"/>
+                    </a:p>
+                  </a:txBody>
+                  <a:tcPr/>
+                </a:tc>
+                <a:extLst>
+                  <a:ext uri="{0D108BD9-81ED-4DB2-BD59-A6C34878D82A}">
+                    <a16:rowId xmlns:a16="http://schemas.microsoft.com/office/drawing/2014/main" val="3399521912"/>
+                  </a:ext>
+                </a:extLst>
+              </a:tr>
+              <a:tr h="370840">
+                <a:tc>
+                  <a:txBody>
+                    <a:bodyPr/>
+                    <a:lstStyle/>
+                    <a:p>
+                      <a:pPr latinLnBrk="1"/>
+                      <a:r>
+                        <a:rPr lang="ko-KR" altLang="en-US" smtClean="0"/>
+                        <a:t>방식</a:t>
+                      </a:r>
+                      <a:endParaRPr lang="ko-KR" altLang="en-US"/>
+                    </a:p>
+                  </a:txBody>
+                  <a:tcPr/>
+                </a:tc>
+                <a:tc>
+                  <a:txBody>
+                    <a:bodyPr/>
+                    <a:lstStyle/>
+                    <a:p>
+                      <a:pPr latinLnBrk="1"/>
+                      <a:endParaRPr lang="ko-KR" altLang="en-US"/>
+                    </a:p>
+                  </a:txBody>
+                  <a:tcPr/>
+                </a:tc>
+                <a:tc>
+                  <a:txBody>
+                    <a:bodyPr/>
+                    <a:lstStyle/>
+                    <a:p>
+                      <a:pPr latinLnBrk="1"/>
+                      <a:endParaRPr lang="ko-KR" altLang="en-US"/>
+                    </a:p>
+                  </a:txBody>
+                  <a:tcPr/>
+                </a:tc>
+                <a:tc>
+                  <a:txBody>
+                    <a:bodyPr/>
+                    <a:lstStyle/>
+                    <a:p>
+                      <a:pPr latinLnBrk="1"/>
+                      <a:endParaRPr lang="ko-KR" altLang="en-US"/>
+                    </a:p>
+                  </a:txBody>
+                  <a:tcPr/>
+                </a:tc>
+                <a:extLst>
+                  <a:ext uri="{0D108BD9-81ED-4DB2-BD59-A6C34878D82A}">
+                    <a16:rowId xmlns:a16="http://schemas.microsoft.com/office/drawing/2014/main" val="3380113062"/>
+                  </a:ext>
+                </a:extLst>
+              </a:tr>
+              <a:tr h="370840">
+                <a:tc>
+                  <a:txBody>
+                    <a:bodyPr/>
+                    <a:lstStyle/>
+                    <a:p>
+                      <a:pPr latinLnBrk="1"/>
+                      <a:endParaRPr lang="ko-KR" altLang="en-US"/>
+                    </a:p>
+                  </a:txBody>
+                  <a:tcPr/>
+                </a:tc>
+                <a:tc>
+                  <a:txBody>
+                    <a:bodyPr/>
+                    <a:lstStyle/>
+                    <a:p>
+                      <a:pPr latinLnBrk="1"/>
+                      <a:endParaRPr lang="ko-KR" altLang="en-US"/>
+                    </a:p>
+                  </a:txBody>
+                  <a:tcPr/>
+                </a:tc>
+                <a:tc>
+                  <a:txBody>
+                    <a:bodyPr/>
+                    <a:lstStyle/>
+                    <a:p>
+                      <a:pPr latinLnBrk="1"/>
+                      <a:endParaRPr lang="ko-KR" altLang="en-US"/>
+                    </a:p>
+                  </a:txBody>
+                  <a:tcPr/>
+                </a:tc>
+                <a:tc>
+                  <a:txBody>
+                    <a:bodyPr/>
+                    <a:lstStyle/>
+                    <a:p>
+                      <a:pPr latinLnBrk="1"/>
+                      <a:endParaRPr lang="ko-KR" altLang="en-US"/>
+                    </a:p>
+                  </a:txBody>
+                  <a:tcPr/>
+                </a:tc>
+                <a:extLst>
+                  <a:ext uri="{0D108BD9-81ED-4DB2-BD59-A6C34878D82A}">
+                    <a16:rowId xmlns:a16="http://schemas.microsoft.com/office/drawing/2014/main" val="1933756291"/>
+                  </a:ext>
+                </a:extLst>
+              </a:tr>
+              <a:tr h="370840">
+                <a:tc>
+                  <a:txBody>
+                    <a:bodyPr/>
+                    <a:lstStyle/>
+                    <a:p>
+                      <a:pPr latinLnBrk="1"/>
+                      <a:endParaRPr lang="ko-KR" altLang="en-US"/>
+                    </a:p>
+                  </a:txBody>
+                  <a:tcPr/>
+                </a:tc>
+                <a:tc>
+                  <a:txBody>
+                    <a:bodyPr/>
+                    <a:lstStyle/>
+                    <a:p>
+                      <a:pPr latinLnBrk="1"/>
+                      <a:endParaRPr lang="ko-KR" altLang="en-US"/>
+                    </a:p>
+                  </a:txBody>
+                  <a:tcPr/>
+                </a:tc>
+                <a:tc>
+                  <a:txBody>
+                    <a:bodyPr/>
+                    <a:lstStyle/>
+                    <a:p>
+                      <a:pPr latinLnBrk="1"/>
+                      <a:endParaRPr lang="ko-KR" altLang="en-US"/>
+                    </a:p>
+                  </a:txBody>
+                  <a:tcPr/>
+                </a:tc>
+                <a:tc>
+                  <a:txBody>
+                    <a:bodyPr/>
+                    <a:lstStyle/>
+                    <a:p>
+                      <a:pPr latinLnBrk="1"/>
+                      <a:endParaRPr lang="ko-KR" altLang="en-US"/>
+                    </a:p>
+                  </a:txBody>
+                  <a:tcPr/>
+                </a:tc>
+                <a:extLst>
+                  <a:ext uri="{0D108BD9-81ED-4DB2-BD59-A6C34878D82A}">
+                    <a16:rowId xmlns:a16="http://schemas.microsoft.com/office/drawing/2014/main" val="2900750693"/>
+                  </a:ext>
+                </a:extLst>
+              </a:tr>
+              <a:tr h="370840">
+                <a:tc>
+                  <a:txBody>
+                    <a:bodyPr/>
+                    <a:lstStyle/>
+                    <a:p>
+                      <a:pPr latinLnBrk="1"/>
+                      <a:endParaRPr lang="ko-KR" altLang="en-US"/>
+                    </a:p>
+                  </a:txBody>
+                  <a:tcPr/>
+                </a:tc>
+                <a:tc>
+                  <a:txBody>
+                    <a:bodyPr/>
+                    <a:lstStyle/>
+                    <a:p>
+                      <a:pPr latinLnBrk="1"/>
+                      <a:endParaRPr lang="ko-KR" altLang="en-US"/>
+                    </a:p>
+                  </a:txBody>
+                  <a:tcPr/>
+                </a:tc>
+                <a:tc>
+                  <a:txBody>
+                    <a:bodyPr/>
+                    <a:lstStyle/>
+                    <a:p>
+                      <a:pPr latinLnBrk="1"/>
+                      <a:endParaRPr lang="ko-KR" altLang="en-US"/>
+                    </a:p>
+                  </a:txBody>
+                  <a:tcPr/>
+                </a:tc>
+                <a:tc>
+                  <a:txBody>
+                    <a:bodyPr/>
+                    <a:lstStyle/>
+                    <a:p>
+                      <a:pPr latinLnBrk="1"/>
+                      <a:endParaRPr lang="en-US" altLang="ko-KR" smtClean="0"/>
+                    </a:p>
+                  </a:txBody>
+                  <a:tcPr/>
+                </a:tc>
+                <a:extLst>
+                  <a:ext uri="{0D108BD9-81ED-4DB2-BD59-A6C34878D82A}">
+                    <a16:rowId xmlns:a16="http://schemas.microsoft.com/office/drawing/2014/main" val="1979977662"/>
+                  </a:ext>
+                </a:extLst>
+              </a:tr>
+            </a:tbl>
+          </a:graphicData>
+        </a:graphic>
+      </p:graphicFrame>
+      <p:sp>
+        <p:nvSpPr>
+          <p:cNvPr id="6" name="제목 1"/>
+          <p:cNvSpPr txBox="1">
+            <a:spLocks/>
+          </p:cNvSpPr>
+          <p:nvPr/>
+        </p:nvSpPr>
+        <p:spPr>
+          <a:xfrm>
+            <a:off x="838200" y="3330028"/>
+            <a:ext cx="10515600" cy="740468"/>
+          </a:xfrm>
+          <a:prstGeom prst="rect">
+            <a:avLst/>
+          </a:prstGeom>
+        </p:spPr>
+        <p:txBody>
+          <a:bodyPr vert="horz" lIns="91440" tIns="45720" rIns="91440" bIns="45720" rtlCol="0" anchor="ctr">
+            <a:normAutofit/>
+          </a:bodyPr>
+          <a:lstStyle>
+            <a:lvl1pPr algn="l" defTabSz="914400" rtl="0" eaLnBrk="1" latinLnBrk="1" hangingPunct="1">
+              <a:lnSpc>
+                <a:spcPct val="90000"/>
+              </a:lnSpc>
+              <a:spcBef>
+                <a:spcPct val="0"/>
+              </a:spcBef>
+              <a:buNone/>
+              <a:defRPr sz="4400" kern="1200">
+                <a:solidFill>
+                  <a:schemeClr val="tx1"/>
+                </a:solidFill>
+                <a:latin typeface="+mj-lt"/>
+                <a:ea typeface="+mj-ea"/>
+                <a:cs typeface="+mj-cs"/>
+              </a:defRPr>
+            </a:lvl1pPr>
+          </a:lstStyle>
+          <a:p>
+            <a:r>
+              <a:rPr lang="en-US" altLang="ko-KR" sz="3200" smtClean="0"/>
+              <a:t>Sink </a:t>
+            </a:r>
+            <a:r>
+              <a:rPr lang="ko-KR" altLang="en-US" sz="3200" smtClean="0"/>
+              <a:t>방식</a:t>
+            </a:r>
+            <a:endParaRPr lang="ko-KR" altLang="en-US" sz="3200"/>
+          </a:p>
+        </p:txBody>
+      </p:sp>
+    </p:spTree>
+    <p:extLst>
+      <p:ext uri="{BB962C8B-B14F-4D97-AF65-F5344CB8AC3E}">
+        <p14:creationId xmlns:p14="http://schemas.microsoft.com/office/powerpoint/2010/main" val="3679707484"/>
+      </p:ext>
+    </p:extLst>
+  </p:cSld>
+  <p:clrMapOvr>
+    <a:masterClrMapping/>
+  </p:clrMapOvr>
+</p:sld>
+</file>
+
+<file path=ppt/slides/slide3.xml><?xml version="1.0" encoding="utf-8"?>
+<p:sld xmlns:a="http://schemas.openxmlformats.org/drawingml/2006/main" xmlns:r="http://schemas.openxmlformats.org/officeDocument/2006/relationships" xmlns:p="http://schemas.openxmlformats.org/presentationml/2006/main">
+  <p:cSld>
+    <p:spTree>
+      <p:nvGrpSpPr>
+        <p:cNvPr id="1" name=""/>
+        <p:cNvGrpSpPr/>
+        <p:nvPr/>
+      </p:nvGrpSpPr>
+      <p:grpSpPr>
+        <a:xfrm>
+          <a:off x="0" y="0"/>
+          <a:ext cx="0" cy="0"/>
+          <a:chOff x="0" y="0"/>
+          <a:chExt cx="0" cy="0"/>
+        </a:xfrm>
+      </p:grpSpPr>
+      <p:sp>
+        <p:nvSpPr>
+          <p:cNvPr id="2" name="제목 1"/>
+          <p:cNvSpPr>
+            <a:spLocks noGrp="1"/>
+          </p:cNvSpPr>
+          <p:nvPr>
+            <p:ph type="title"/>
+          </p:nvPr>
+        </p:nvSpPr>
+        <p:spPr/>
+        <p:txBody>
+          <a:bodyPr/>
+          <a:lstStyle/>
+          <a:p>
+            <a:r>
+              <a:rPr lang="en-US" altLang="ko-KR" smtClean="0"/>
+              <a:t>Source – Sink </a:t>
+            </a:r>
+            <a:r>
+              <a:rPr lang="ko-KR" altLang="en-US" smtClean="0"/>
+              <a:t>조합</a:t>
+            </a:r>
+            <a:endParaRPr lang="ko-KR" altLang="en-US"/>
+          </a:p>
+        </p:txBody>
+      </p:sp>
+      <p:graphicFrame>
+        <p:nvGraphicFramePr>
+          <p:cNvPr id="4" name="내용 개체 틀 3"/>
+          <p:cNvGraphicFramePr>
+            <a:graphicFrameLocks noGrp="1"/>
+          </p:cNvGraphicFramePr>
+          <p:nvPr>
+            <p:ph idx="1"/>
+            <p:extLst>
+              <p:ext uri="{D42A27DB-BD31-4B8C-83A1-F6EECF244321}">
+                <p14:modId xmlns:p14="http://schemas.microsoft.com/office/powerpoint/2010/main" val="1569417809"/>
+              </p:ext>
+            </p:extLst>
+          </p:nvPr>
+        </p:nvGraphicFramePr>
+        <p:xfrm>
+          <a:off x="838200" y="1825625"/>
+          <a:ext cx="10515600" cy="3708400"/>
+        </p:xfrm>
+        <a:graphic>
+          <a:graphicData uri="http://schemas.openxmlformats.org/drawingml/2006/table">
+            <a:tbl>
+              <a:tblPr firstRow="1" bandRow="1">
+                <a:tableStyleId>{5C22544A-7EE6-4342-B048-85BDC9FD1C3A}</a:tableStyleId>
+              </a:tblPr>
+              <a:tblGrid>
+                <a:gridCol w="466898">
+                  <a:extLst>
+                    <a:ext uri="{9D8B030D-6E8A-4147-A177-3AD203B41FA5}">
+                      <a16:colId xmlns:a16="http://schemas.microsoft.com/office/drawing/2014/main" val="2271405166"/>
+                    </a:ext>
+                  </a:extLst>
+                </a:gridCol>
+                <a:gridCol w="2128058">
+                  <a:extLst>
+                    <a:ext uri="{9D8B030D-6E8A-4147-A177-3AD203B41FA5}">
+                      <a16:colId xmlns:a16="http://schemas.microsoft.com/office/drawing/2014/main" val="322916108"/>
+                    </a:ext>
+                  </a:extLst>
+                </a:gridCol>
+                <a:gridCol w="2078182">
+                  <a:extLst>
+                    <a:ext uri="{9D8B030D-6E8A-4147-A177-3AD203B41FA5}">
+                      <a16:colId xmlns:a16="http://schemas.microsoft.com/office/drawing/2014/main" val="137231634"/>
+                    </a:ext>
+                  </a:extLst>
+                </a:gridCol>
+                <a:gridCol w="1022466">
+                  <a:extLst>
+                    <a:ext uri="{9D8B030D-6E8A-4147-A177-3AD203B41FA5}">
+                      <a16:colId xmlns:a16="http://schemas.microsoft.com/office/drawing/2014/main" val="3355149843"/>
+                    </a:ext>
+                  </a:extLst>
+                </a:gridCol>
+                <a:gridCol w="4819996">
+                  <a:extLst>
+                    <a:ext uri="{9D8B030D-6E8A-4147-A177-3AD203B41FA5}">
+                      <a16:colId xmlns:a16="http://schemas.microsoft.com/office/drawing/2014/main" val="1805140875"/>
+                    </a:ext>
+                  </a:extLst>
+                </a:gridCol>
+              </a:tblGrid>
+              <a:tr h="370840">
+                <a:tc>
+                  <a:txBody>
+                    <a:bodyPr/>
+                    <a:lstStyle/>
+                    <a:p>
+                      <a:pPr latinLnBrk="1"/>
+                      <a:endParaRPr lang="ko-KR" altLang="en-US" sz="1600"/>
+                    </a:p>
+                  </a:txBody>
+                  <a:tcPr/>
+                </a:tc>
+                <a:tc>
+                  <a:txBody>
+                    <a:bodyPr/>
+                    <a:lstStyle/>
+                    <a:p>
+                      <a:pPr latinLnBrk="1"/>
+                      <a:r>
+                        <a:rPr lang="en-US" altLang="ko-KR" sz="1600" smtClean="0"/>
+                        <a:t>Source </a:t>
+                      </a:r>
+                      <a:r>
+                        <a:rPr lang="ko-KR" altLang="en-US" sz="1600" smtClean="0"/>
+                        <a:t>방식</a:t>
+                      </a:r>
+                      <a:endParaRPr lang="ko-KR" altLang="en-US" sz="1600"/>
+                    </a:p>
+                  </a:txBody>
+                  <a:tcPr/>
+                </a:tc>
+                <a:tc>
+                  <a:txBody>
+                    <a:bodyPr/>
+                    <a:lstStyle/>
+                    <a:p>
+                      <a:pPr latinLnBrk="1"/>
+                      <a:r>
+                        <a:rPr lang="en-US" altLang="ko-KR" sz="1600" smtClean="0"/>
+                        <a:t>Sink </a:t>
+                      </a:r>
+                      <a:r>
+                        <a:rPr lang="ko-KR" altLang="en-US" sz="1600" smtClean="0"/>
+                        <a:t>방식</a:t>
+                      </a:r>
+                      <a:endParaRPr lang="ko-KR" altLang="en-US" sz="1600"/>
+                    </a:p>
+                  </a:txBody>
+                  <a:tcPr/>
+                </a:tc>
+                <a:tc>
+                  <a:txBody>
+                    <a:bodyPr/>
+                    <a:lstStyle/>
+                    <a:p>
+                      <a:pPr latinLnBrk="1"/>
+                      <a:r>
+                        <a:rPr lang="ko-KR" altLang="en-US" sz="1600" smtClean="0"/>
+                        <a:t>확인대상</a:t>
+                      </a:r>
+                      <a:endParaRPr lang="ko-KR" altLang="en-US" sz="1600"/>
+                    </a:p>
+                  </a:txBody>
+                  <a:tcPr/>
+                </a:tc>
+                <a:tc>
+                  <a:txBody>
+                    <a:bodyPr/>
+                    <a:lstStyle/>
+                    <a:p>
+                      <a:pPr latinLnBrk="1"/>
+                      <a:endParaRPr lang="ko-KR" altLang="en-US" sz="1600"/>
+                    </a:p>
+                  </a:txBody>
+                  <a:tcPr/>
+                </a:tc>
+                <a:extLst>
+                  <a:ext uri="{0D108BD9-81ED-4DB2-BD59-A6C34878D82A}">
+                    <a16:rowId xmlns:a16="http://schemas.microsoft.com/office/drawing/2014/main" val="444051763"/>
+                  </a:ext>
+                </a:extLst>
+              </a:tr>
+              <a:tr h="370840">
+                <a:tc>
+                  <a:txBody>
+                    <a:bodyPr/>
+                    <a:lstStyle/>
+                    <a:p>
+                      <a:pPr latinLnBrk="1"/>
+                      <a:r>
+                        <a:rPr lang="en-US" altLang="ko-KR" sz="1600" smtClean="0"/>
+                        <a:t>1</a:t>
+                      </a:r>
+                      <a:endParaRPr lang="ko-KR" altLang="en-US" sz="1600"/>
+                    </a:p>
+                  </a:txBody>
+                  <a:tcPr/>
+                </a:tc>
+                <a:tc rowSpan="3">
+                  <a:txBody>
+                    <a:bodyPr/>
+                    <a:lstStyle/>
+                    <a:p>
+                      <a:pPr latinLnBrk="1"/>
+                      <a:r>
+                        <a:rPr lang="en-US" altLang="ko-KR" sz="1600" smtClean="0"/>
+                        <a:t>NiFi JDBC</a:t>
+                      </a:r>
+                      <a:endParaRPr lang="ko-KR" altLang="en-US" sz="1600"/>
+                    </a:p>
+                  </a:txBody>
+                  <a:tcPr anchor="ctr"/>
+                </a:tc>
+                <a:tc>
+                  <a:txBody>
+                    <a:bodyPr/>
+                    <a:lstStyle/>
+                    <a:p>
+                      <a:pPr latinLnBrk="1"/>
+                      <a:r>
+                        <a:rPr lang="en-US" altLang="ko-KR" sz="1600" smtClean="0"/>
+                        <a:t>NiFi JDBC</a:t>
+                      </a:r>
+                      <a:endParaRPr lang="ko-KR" altLang="en-US" sz="1600"/>
+                    </a:p>
+                  </a:txBody>
+                  <a:tcPr/>
+                </a:tc>
+                <a:tc>
+                  <a:txBody>
+                    <a:bodyPr/>
+                    <a:lstStyle/>
+                    <a:p>
+                      <a:pPr algn="ctr" latinLnBrk="1"/>
+                      <a:r>
+                        <a:rPr lang="en-US" altLang="ko-KR" sz="1600" smtClean="0"/>
+                        <a:t>O</a:t>
+                      </a:r>
+                      <a:endParaRPr lang="ko-KR" altLang="en-US" sz="1600"/>
+                    </a:p>
+                  </a:txBody>
+                  <a:tcPr/>
+                </a:tc>
+                <a:tc>
+                  <a:txBody>
+                    <a:bodyPr/>
+                    <a:lstStyle/>
+                    <a:p>
+                      <a:pPr latinLnBrk="1"/>
+                      <a:endParaRPr lang="ko-KR" altLang="en-US" sz="1600"/>
+                    </a:p>
+                  </a:txBody>
+                  <a:tcPr/>
+                </a:tc>
+                <a:extLst>
+                  <a:ext uri="{0D108BD9-81ED-4DB2-BD59-A6C34878D82A}">
+                    <a16:rowId xmlns:a16="http://schemas.microsoft.com/office/drawing/2014/main" val="4125337314"/>
+                  </a:ext>
+                </a:extLst>
+              </a:tr>
+              <a:tr h="370840">
+                <a:tc>
+                  <a:txBody>
+                    <a:bodyPr/>
+                    <a:lstStyle/>
+                    <a:p>
+                      <a:pPr latinLnBrk="1"/>
+                      <a:r>
+                        <a:rPr lang="en-US" altLang="ko-KR" sz="1600" smtClean="0"/>
+                        <a:t>2</a:t>
+                      </a:r>
+                      <a:endParaRPr lang="ko-KR" altLang="en-US" sz="1600"/>
+                    </a:p>
+                  </a:txBody>
+                  <a:tcPr/>
+                </a:tc>
+                <a:tc vMerge="1">
+                  <a:txBody>
+                    <a:bodyPr/>
+                    <a:lstStyle/>
+                    <a:p>
+                      <a:pPr latinLnBrk="1"/>
+                      <a:endParaRPr lang="ko-KR" altLang="en-US"/>
+                    </a:p>
+                  </a:txBody>
+                  <a:tcPr/>
+                </a:tc>
+                <a:tc>
+                  <a:txBody>
+                    <a:bodyPr/>
+                    <a:lstStyle/>
+                    <a:p>
+                      <a:pPr latinLnBrk="1"/>
+                      <a:r>
+                        <a:rPr lang="en-US" altLang="ko-KR" sz="1600" smtClean="0"/>
+                        <a:t>Kafka Connect JDBC</a:t>
+                      </a:r>
+                      <a:endParaRPr lang="ko-KR" altLang="en-US" sz="1600"/>
+                    </a:p>
+                  </a:txBody>
+                  <a:tcPr/>
+                </a:tc>
+                <a:tc>
+                  <a:txBody>
+                    <a:bodyPr/>
+                    <a:lstStyle/>
+                    <a:p>
+                      <a:pPr algn="ctr" latinLnBrk="1"/>
+                      <a:r>
+                        <a:rPr lang="en-US" altLang="ko-KR" sz="1600" smtClean="0"/>
+                        <a:t>X</a:t>
+                      </a:r>
+                      <a:endParaRPr lang="ko-KR" altLang="en-US" sz="1600"/>
+                    </a:p>
+                  </a:txBody>
+                  <a:tcPr/>
+                </a:tc>
+                <a:tc>
+                  <a:txBody>
+                    <a:bodyPr/>
+                    <a:lstStyle/>
+                    <a:p>
+                      <a:pPr latinLnBrk="1"/>
+                      <a:endParaRPr lang="ko-KR" altLang="en-US" sz="1600"/>
+                    </a:p>
+                  </a:txBody>
+                  <a:tcPr/>
+                </a:tc>
+                <a:extLst>
+                  <a:ext uri="{0D108BD9-81ED-4DB2-BD59-A6C34878D82A}">
+                    <a16:rowId xmlns:a16="http://schemas.microsoft.com/office/drawing/2014/main" val="2899770959"/>
+                  </a:ext>
+                </a:extLst>
+              </a:tr>
+              <a:tr h="370840">
+                <a:tc>
+                  <a:txBody>
+                    <a:bodyPr/>
+                    <a:lstStyle/>
+                    <a:p>
+                      <a:pPr latinLnBrk="1"/>
+                      <a:r>
+                        <a:rPr lang="en-US" altLang="ko-KR" sz="1600" smtClean="0"/>
+                        <a:t>3</a:t>
+                      </a:r>
+                      <a:endParaRPr lang="ko-KR" altLang="en-US" sz="1600"/>
+                    </a:p>
+                  </a:txBody>
+                  <a:tcPr/>
+                </a:tc>
+                <a:tc vMerge="1">
+                  <a:txBody>
+                    <a:bodyPr/>
+                    <a:lstStyle/>
+                    <a:p>
+                      <a:pPr latinLnBrk="1"/>
+                      <a:endParaRPr lang="ko-KR" altLang="en-US"/>
+                    </a:p>
+                  </a:txBody>
+                  <a:tcPr/>
+                </a:tc>
+                <a:tc>
+                  <a:txBody>
+                    <a:bodyPr/>
+                    <a:lstStyle/>
+                    <a:p>
+                      <a:pPr latinLnBrk="1"/>
+                      <a:r>
+                        <a:rPr lang="en-US" altLang="ko-KR" sz="1600" smtClean="0"/>
+                        <a:t>Kafka Connect OGG</a:t>
+                      </a:r>
+                      <a:endParaRPr lang="ko-KR" altLang="en-US" sz="1600"/>
+                    </a:p>
+                  </a:txBody>
+                  <a:tcPr/>
+                </a:tc>
+                <a:tc>
+                  <a:txBody>
+                    <a:bodyPr/>
+                    <a:lstStyle/>
+                    <a:p>
+                      <a:pPr algn="ctr" latinLnBrk="1"/>
+                      <a:r>
+                        <a:rPr lang="en-US" altLang="ko-KR" sz="1600" smtClean="0"/>
+                        <a:t>X</a:t>
+                      </a:r>
+                      <a:endParaRPr lang="ko-KR" altLang="en-US" sz="1600"/>
+                    </a:p>
+                  </a:txBody>
+                  <a:tcPr/>
+                </a:tc>
+                <a:tc>
+                  <a:txBody>
+                    <a:bodyPr/>
+                    <a:lstStyle/>
+                    <a:p>
+                      <a:pPr latinLnBrk="1"/>
+                      <a:r>
+                        <a:rPr lang="en-US" altLang="ko-KR" sz="1600" smtClean="0"/>
+                        <a:t>Json</a:t>
+                      </a:r>
+                      <a:r>
+                        <a:rPr lang="ko-KR" altLang="en-US" sz="1600" baseline="0" smtClean="0"/>
+                        <a:t> </a:t>
+                      </a:r>
+                      <a:r>
+                        <a:rPr lang="en-US" altLang="ko-KR" sz="1600" baseline="0" smtClean="0"/>
+                        <a:t>data </a:t>
+                      </a:r>
+                      <a:r>
+                        <a:rPr lang="ko-KR" altLang="en-US" sz="1600" baseline="0" smtClean="0"/>
+                        <a:t>형식을 </a:t>
+                      </a:r>
+                      <a:r>
+                        <a:rPr lang="en-US" altLang="ko-KR" sz="1600" baseline="0" smtClean="0"/>
+                        <a:t>OGG </a:t>
+                      </a:r>
+                      <a:r>
+                        <a:rPr lang="ko-KR" altLang="en-US" sz="1600" baseline="0" smtClean="0"/>
+                        <a:t>에서 사용할 수 있을까</a:t>
+                      </a:r>
+                      <a:r>
+                        <a:rPr lang="en-US" altLang="ko-KR" sz="1600" baseline="0" smtClean="0"/>
+                        <a:t>?</a:t>
+                      </a:r>
+                      <a:endParaRPr lang="ko-KR" altLang="en-US" sz="1600"/>
+                    </a:p>
+                  </a:txBody>
+                  <a:tcPr/>
+                </a:tc>
+                <a:extLst>
+                  <a:ext uri="{0D108BD9-81ED-4DB2-BD59-A6C34878D82A}">
+                    <a16:rowId xmlns:a16="http://schemas.microsoft.com/office/drawing/2014/main" val="2502572958"/>
+                  </a:ext>
+                </a:extLst>
+              </a:tr>
+              <a:tr h="370840">
+                <a:tc>
+                  <a:txBody>
+                    <a:bodyPr/>
+                    <a:lstStyle/>
+                    <a:p>
+                      <a:pPr latinLnBrk="1"/>
+                      <a:r>
+                        <a:rPr lang="en-US" altLang="ko-KR" sz="1600" smtClean="0"/>
+                        <a:t>4</a:t>
+                      </a:r>
+                      <a:endParaRPr lang="ko-KR" altLang="en-US" sz="1600"/>
+                    </a:p>
+                  </a:txBody>
+                  <a:tcPr/>
+                </a:tc>
+                <a:tc rowSpan="3">
+                  <a:txBody>
+                    <a:bodyPr/>
+                    <a:lstStyle/>
+                    <a:p>
+                      <a:pPr latinLnBrk="1"/>
+                      <a:r>
+                        <a:rPr lang="en-US" altLang="ko-KR" sz="1600" smtClean="0"/>
+                        <a:t>Kafka Connect JDBC</a:t>
+                      </a:r>
+                      <a:endParaRPr lang="ko-KR" altLang="en-US" sz="1600"/>
+                    </a:p>
+                  </a:txBody>
+                  <a:tcPr anchor="ctr"/>
+                </a:tc>
+                <a:tc>
+                  <a:txBody>
+                    <a:bodyPr/>
+                    <a:lstStyle/>
+                    <a:p>
+                      <a:pPr latinLnBrk="1"/>
+                      <a:r>
+                        <a:rPr lang="en-US" altLang="ko-KR" sz="1600" smtClean="0"/>
+                        <a:t>NiFi JDBC</a:t>
+                      </a:r>
+                      <a:endParaRPr lang="ko-KR" altLang="en-US" sz="1600"/>
+                    </a:p>
+                  </a:txBody>
+                  <a:tcPr/>
+                </a:tc>
+                <a:tc>
+                  <a:txBody>
+                    <a:bodyPr/>
+                    <a:lstStyle/>
+                    <a:p>
+                      <a:pPr algn="ctr" latinLnBrk="1"/>
+                      <a:r>
+                        <a:rPr lang="en-US" altLang="ko-KR" sz="1600" smtClean="0"/>
+                        <a:t>O</a:t>
+                      </a:r>
+                      <a:endParaRPr lang="ko-KR" altLang="en-US" sz="1600"/>
+                    </a:p>
+                  </a:txBody>
+                  <a:tcPr/>
+                </a:tc>
+                <a:tc>
+                  <a:txBody>
+                    <a:bodyPr/>
+                    <a:lstStyle/>
+                    <a:p>
+                      <a:pPr latinLnBrk="1"/>
+                      <a:r>
+                        <a:rPr lang="en-US" altLang="ko-KR" sz="1600" smtClean="0"/>
+                        <a:t>Data transform</a:t>
+                      </a:r>
+                      <a:r>
+                        <a:rPr lang="en-US" altLang="ko-KR" sz="1600" baseline="0" smtClean="0"/>
+                        <a:t> </a:t>
+                      </a:r>
+                      <a:r>
+                        <a:rPr lang="ko-KR" altLang="en-US" sz="1600" baseline="0" smtClean="0"/>
+                        <a:t>요건에 따라 필요</a:t>
+                      </a:r>
+                      <a:endParaRPr lang="ko-KR" altLang="en-US" sz="1600"/>
+                    </a:p>
+                  </a:txBody>
+                  <a:tcPr/>
+                </a:tc>
+                <a:extLst>
+                  <a:ext uri="{0D108BD9-81ED-4DB2-BD59-A6C34878D82A}">
+                    <a16:rowId xmlns:a16="http://schemas.microsoft.com/office/drawing/2014/main" val="3616220543"/>
+                  </a:ext>
+                </a:extLst>
+              </a:tr>
+              <a:tr h="370840">
+                <a:tc>
+                  <a:txBody>
+                    <a:bodyPr/>
+                    <a:lstStyle/>
+                    <a:p>
+                      <a:pPr latinLnBrk="1"/>
+                      <a:r>
+                        <a:rPr lang="en-US" altLang="ko-KR" sz="1600" smtClean="0"/>
+                        <a:t>5</a:t>
+                      </a:r>
+                      <a:endParaRPr lang="ko-KR" altLang="en-US" sz="1600"/>
+                    </a:p>
+                  </a:txBody>
+                  <a:tcPr/>
+                </a:tc>
+                <a:tc vMerge="1">
+                  <a:txBody>
+                    <a:bodyPr/>
+                    <a:lstStyle/>
+                    <a:p>
+                      <a:pPr latinLnBrk="1"/>
+                      <a:endParaRPr lang="ko-KR" altLang="en-US"/>
+                    </a:p>
+                  </a:txBody>
+                  <a:tcPr/>
+                </a:tc>
+                <a:tc>
+                  <a:txBody>
+                    <a:bodyPr/>
+                    <a:lstStyle/>
+                    <a:p>
+                      <a:pPr latinLnBrk="1"/>
+                      <a:r>
+                        <a:rPr lang="en-US" altLang="ko-KR" sz="1600" smtClean="0"/>
+                        <a:t>Kafka Connect JDBC</a:t>
+                      </a:r>
+                      <a:endParaRPr lang="ko-KR" altLang="en-US" sz="1600"/>
+                    </a:p>
+                  </a:txBody>
+                  <a:tcPr/>
+                </a:tc>
+                <a:tc>
+                  <a:txBody>
+                    <a:bodyPr/>
+                    <a:lstStyle/>
+                    <a:p>
+                      <a:pPr algn="ctr" latinLnBrk="1"/>
+                      <a:r>
+                        <a:rPr lang="en-US" altLang="ko-KR" sz="1600" smtClean="0"/>
+                        <a:t>O</a:t>
+                      </a:r>
+                      <a:endParaRPr lang="ko-KR" altLang="en-US" sz="1600"/>
+                    </a:p>
+                  </a:txBody>
+                  <a:tcPr/>
+                </a:tc>
+                <a:tc>
+                  <a:txBody>
+                    <a:bodyPr/>
+                    <a:lstStyle/>
+                    <a:p>
+                      <a:pPr latinLnBrk="1"/>
+                      <a:endParaRPr lang="ko-KR" altLang="en-US" sz="1600"/>
+                    </a:p>
+                  </a:txBody>
+                  <a:tcPr/>
+                </a:tc>
+                <a:extLst>
+                  <a:ext uri="{0D108BD9-81ED-4DB2-BD59-A6C34878D82A}">
+                    <a16:rowId xmlns:a16="http://schemas.microsoft.com/office/drawing/2014/main" val="2223729978"/>
+                  </a:ext>
+                </a:extLst>
+              </a:tr>
+              <a:tr h="370840">
+                <a:tc>
+                  <a:txBody>
+                    <a:bodyPr/>
+                    <a:lstStyle/>
+                    <a:p>
+                      <a:pPr latinLnBrk="1"/>
+                      <a:r>
+                        <a:rPr lang="en-US" altLang="ko-KR" sz="1600" smtClean="0"/>
+                        <a:t>6</a:t>
+                      </a:r>
+                      <a:endParaRPr lang="ko-KR" altLang="en-US" sz="1600"/>
+                    </a:p>
+                  </a:txBody>
+                  <a:tcPr/>
+                </a:tc>
+                <a:tc vMerge="1">
+                  <a:txBody>
+                    <a:bodyPr/>
+                    <a:lstStyle/>
+                    <a:p>
+                      <a:pPr latinLnBrk="1"/>
+                      <a:endParaRPr lang="ko-KR" altLang="en-US"/>
+                    </a:p>
+                  </a:txBody>
+                  <a:tcPr/>
+                </a:tc>
+                <a:tc>
+                  <a:txBody>
+                    <a:bodyPr/>
+                    <a:lstStyle/>
+                    <a:p>
+                      <a:pPr latinLnBrk="1"/>
+                      <a:r>
+                        <a:rPr lang="en-US" altLang="ko-KR" sz="1600" smtClean="0"/>
+                        <a:t>Kafka Connect OGG</a:t>
+                      </a:r>
+                      <a:endParaRPr lang="ko-KR" altLang="en-US" sz="1600"/>
+                    </a:p>
+                  </a:txBody>
+                  <a:tcPr/>
+                </a:tc>
+                <a:tc>
+                  <a:txBody>
+                    <a:bodyPr/>
+                    <a:lstStyle/>
+                    <a:p>
+                      <a:pPr algn="ctr" latinLnBrk="1"/>
+                      <a:r>
+                        <a:rPr lang="en-US" altLang="ko-KR" sz="1600" smtClean="0"/>
+                        <a:t>X</a:t>
+                      </a:r>
+                      <a:endParaRPr lang="ko-KR" altLang="en-US" sz="1600"/>
+                    </a:p>
+                  </a:txBody>
+                  <a:tcPr/>
+                </a:tc>
+                <a:tc>
+                  <a:txBody>
+                    <a:bodyPr/>
+                    <a:lstStyle/>
+                    <a:p>
+                      <a:pPr latinLnBrk="1"/>
+                      <a:r>
+                        <a:rPr lang="en-US" altLang="ko-KR" sz="1600" smtClean="0"/>
+                        <a:t>Json</a:t>
+                      </a:r>
+                      <a:r>
+                        <a:rPr lang="ko-KR" altLang="en-US" sz="1600" baseline="0" smtClean="0"/>
+                        <a:t> </a:t>
+                      </a:r>
+                      <a:r>
+                        <a:rPr lang="en-US" altLang="ko-KR" sz="1600" baseline="0" smtClean="0"/>
+                        <a:t>data </a:t>
+                      </a:r>
+                      <a:r>
+                        <a:rPr lang="ko-KR" altLang="en-US" sz="1600" baseline="0" smtClean="0"/>
+                        <a:t>형식을 </a:t>
+                      </a:r>
+                      <a:r>
+                        <a:rPr lang="en-US" altLang="ko-KR" sz="1600" baseline="0" smtClean="0"/>
+                        <a:t>OGG </a:t>
+                      </a:r>
+                      <a:r>
+                        <a:rPr lang="ko-KR" altLang="en-US" sz="1600" baseline="0" smtClean="0"/>
+                        <a:t>에서 사용할 수 있을까</a:t>
+                      </a:r>
+                      <a:r>
+                        <a:rPr lang="en-US" altLang="ko-KR" sz="1600" baseline="0" smtClean="0"/>
+                        <a:t>?</a:t>
+                      </a:r>
+                      <a:endParaRPr lang="ko-KR" altLang="en-US" sz="1600"/>
+                    </a:p>
+                  </a:txBody>
+                  <a:tcPr/>
+                </a:tc>
+                <a:extLst>
+                  <a:ext uri="{0D108BD9-81ED-4DB2-BD59-A6C34878D82A}">
+                    <a16:rowId xmlns:a16="http://schemas.microsoft.com/office/drawing/2014/main" val="1194807113"/>
+                  </a:ext>
+                </a:extLst>
+              </a:tr>
+              <a:tr h="370840">
+                <a:tc>
+                  <a:txBody>
+                    <a:bodyPr/>
+                    <a:lstStyle/>
+                    <a:p>
+                      <a:pPr latinLnBrk="1"/>
+                      <a:r>
+                        <a:rPr lang="en-US" altLang="ko-KR" sz="1600" smtClean="0"/>
+                        <a:t>7</a:t>
+                      </a:r>
+                      <a:endParaRPr lang="ko-KR" altLang="en-US" sz="1600"/>
+                    </a:p>
+                  </a:txBody>
+                  <a:tcPr/>
+                </a:tc>
+                <a:tc rowSpan="3">
+                  <a:txBody>
+                    <a:bodyPr/>
+                    <a:lstStyle/>
+                    <a:p>
+                      <a:pPr latinLnBrk="1"/>
+                      <a:r>
+                        <a:rPr lang="en-US" altLang="ko-KR" sz="1600" smtClean="0"/>
+                        <a:t>Kafka Connect OGG</a:t>
+                      </a:r>
+                      <a:endParaRPr lang="ko-KR" altLang="en-US" sz="1600"/>
+                    </a:p>
+                  </a:txBody>
+                  <a:tcPr anchor="ctr"/>
+                </a:tc>
+                <a:tc>
+                  <a:txBody>
+                    <a:bodyPr/>
+                    <a:lstStyle/>
+                    <a:p>
+                      <a:pPr latinLnBrk="1"/>
+                      <a:r>
+                        <a:rPr lang="en-US" altLang="ko-KR" sz="1600" smtClean="0"/>
+                        <a:t>NiFi JDBC</a:t>
+                      </a:r>
+                      <a:endParaRPr lang="ko-KR" altLang="en-US" sz="1600"/>
+                    </a:p>
+                  </a:txBody>
+                  <a:tcPr/>
+                </a:tc>
+                <a:tc>
+                  <a:txBody>
+                    <a:bodyPr/>
+                    <a:lstStyle/>
+                    <a:p>
+                      <a:pPr algn="ctr" latinLnBrk="1"/>
+                      <a:r>
+                        <a:rPr lang="en-US" altLang="ko-KR" sz="1600" smtClean="0"/>
+                        <a:t>??</a:t>
+                      </a:r>
+                      <a:endParaRPr lang="ko-KR" altLang="en-US" sz="1600"/>
+                    </a:p>
+                  </a:txBody>
+                  <a:tcPr/>
+                </a:tc>
+                <a:tc>
+                  <a:txBody>
+                    <a:bodyPr/>
+                    <a:lstStyle/>
+                    <a:p>
+                      <a:pPr latinLnBrk="1"/>
+                      <a:r>
+                        <a:rPr lang="en-US" altLang="ko-KR" sz="1600" smtClean="0"/>
+                        <a:t>OGG</a:t>
+                      </a:r>
+                      <a:r>
+                        <a:rPr lang="en-US" altLang="ko-KR" sz="1600" baseline="0" smtClean="0"/>
+                        <a:t> data </a:t>
+                      </a:r>
+                      <a:r>
+                        <a:rPr lang="ko-KR" altLang="en-US" sz="1600" baseline="0" smtClean="0"/>
+                        <a:t>형식을 </a:t>
+                      </a:r>
+                      <a:r>
+                        <a:rPr lang="en-US" altLang="ko-KR" sz="1600" baseline="0" smtClean="0"/>
+                        <a:t>jdbc </a:t>
+                      </a:r>
+                      <a:r>
+                        <a:rPr lang="ko-KR" altLang="en-US" sz="1600" baseline="0" smtClean="0"/>
+                        <a:t>에서 사용할 수 있을까</a:t>
+                      </a:r>
+                      <a:r>
+                        <a:rPr lang="en-US" altLang="ko-KR" sz="1600" baseline="0" smtClean="0"/>
+                        <a:t>?</a:t>
+                      </a:r>
+                      <a:endParaRPr lang="ko-KR" altLang="en-US" sz="1600"/>
+                    </a:p>
+                  </a:txBody>
+                  <a:tcPr/>
+                </a:tc>
+                <a:extLst>
+                  <a:ext uri="{0D108BD9-81ED-4DB2-BD59-A6C34878D82A}">
+                    <a16:rowId xmlns:a16="http://schemas.microsoft.com/office/drawing/2014/main" val="3244959890"/>
+                  </a:ext>
+                </a:extLst>
+              </a:tr>
+              <a:tr h="370840">
+                <a:tc>
+                  <a:txBody>
+                    <a:bodyPr/>
+                    <a:lstStyle/>
+                    <a:p>
+                      <a:pPr latinLnBrk="1"/>
+                      <a:r>
+                        <a:rPr lang="en-US" altLang="ko-KR" sz="1600" smtClean="0"/>
+                        <a:t>8</a:t>
+                      </a:r>
+                      <a:endParaRPr lang="ko-KR" altLang="en-US" sz="1600"/>
+                    </a:p>
+                  </a:txBody>
+                  <a:tcPr/>
+                </a:tc>
+                <a:tc vMerge="1">
+                  <a:txBody>
+                    <a:bodyPr/>
+                    <a:lstStyle/>
+                    <a:p>
+                      <a:pPr latinLnBrk="1"/>
+                      <a:endParaRPr lang="ko-KR" altLang="en-US"/>
+                    </a:p>
+                  </a:txBody>
+                  <a:tcPr/>
+                </a:tc>
+                <a:tc>
+                  <a:txBody>
+                    <a:bodyPr/>
+                    <a:lstStyle/>
+                    <a:p>
+                      <a:pPr latinLnBrk="1"/>
+                      <a:r>
+                        <a:rPr lang="en-US" altLang="ko-KR" sz="1600" smtClean="0"/>
+                        <a:t>Kafka Connect JDBC</a:t>
+                      </a:r>
+                      <a:endParaRPr lang="ko-KR" altLang="en-US" sz="1600"/>
+                    </a:p>
+                  </a:txBody>
+                  <a:tcPr/>
+                </a:tc>
+                <a:tc>
+                  <a:txBody>
+                    <a:bodyPr/>
+                    <a:lstStyle/>
+                    <a:p>
+                      <a:pPr algn="ctr" latinLnBrk="1"/>
+                      <a:r>
+                        <a:rPr lang="en-US" altLang="ko-KR" sz="1600" smtClean="0"/>
+                        <a:t>??</a:t>
+                      </a:r>
+                      <a:endParaRPr lang="ko-KR" altLang="en-US" sz="1600"/>
+                    </a:p>
+                  </a:txBody>
+                  <a:tcPr/>
+                </a:tc>
+                <a:tc>
+                  <a:txBody>
+                    <a:bodyPr/>
+                    <a:lstStyle/>
+                    <a:p>
+                      <a:pPr latinLnBrk="1"/>
+                      <a:r>
+                        <a:rPr lang="en-US" altLang="ko-KR" sz="1600" smtClean="0"/>
+                        <a:t>OGG</a:t>
+                      </a:r>
+                      <a:r>
+                        <a:rPr lang="en-US" altLang="ko-KR" sz="1600" baseline="0" smtClean="0"/>
+                        <a:t> data </a:t>
+                      </a:r>
+                      <a:r>
+                        <a:rPr lang="ko-KR" altLang="en-US" sz="1600" baseline="0" smtClean="0"/>
+                        <a:t>형식을 </a:t>
+                      </a:r>
+                      <a:r>
+                        <a:rPr lang="en-US" altLang="ko-KR" sz="1600" baseline="0" smtClean="0"/>
+                        <a:t>jdbc </a:t>
+                      </a:r>
+                      <a:r>
+                        <a:rPr lang="ko-KR" altLang="en-US" sz="1600" baseline="0" smtClean="0"/>
+                        <a:t>에서 사용할 수 있을까</a:t>
+                      </a:r>
+                      <a:endParaRPr lang="ko-KR" altLang="en-US" sz="1600"/>
+                    </a:p>
+                  </a:txBody>
+                  <a:tcPr/>
+                </a:tc>
+                <a:extLst>
+                  <a:ext uri="{0D108BD9-81ED-4DB2-BD59-A6C34878D82A}">
+                    <a16:rowId xmlns:a16="http://schemas.microsoft.com/office/drawing/2014/main" val="2952549331"/>
+                  </a:ext>
+                </a:extLst>
+              </a:tr>
+              <a:tr h="370840">
+                <a:tc>
+                  <a:txBody>
+                    <a:bodyPr/>
+                    <a:lstStyle/>
+                    <a:p>
+                      <a:pPr latinLnBrk="1"/>
+                      <a:r>
+                        <a:rPr lang="en-US" altLang="ko-KR" sz="1600" smtClean="0"/>
+                        <a:t>9</a:t>
+                      </a:r>
+                      <a:endParaRPr lang="ko-KR" altLang="en-US" sz="1600"/>
+                    </a:p>
+                  </a:txBody>
+                  <a:tcPr/>
+                </a:tc>
+                <a:tc vMerge="1">
+                  <a:txBody>
+                    <a:bodyPr/>
+                    <a:lstStyle/>
+                    <a:p>
+                      <a:pPr latinLnBrk="1"/>
+                      <a:endParaRPr lang="ko-KR" altLang="en-US"/>
+                    </a:p>
+                  </a:txBody>
+                  <a:tcPr/>
+                </a:tc>
+                <a:tc>
+                  <a:txBody>
+                    <a:bodyPr/>
+                    <a:lstStyle/>
+                    <a:p>
+                      <a:pPr latinLnBrk="1"/>
+                      <a:r>
+                        <a:rPr lang="en-US" altLang="ko-KR" sz="1600" smtClean="0"/>
+                        <a:t>Kafka Connect OGG</a:t>
+                      </a:r>
+                      <a:endParaRPr lang="ko-KR" altLang="en-US" sz="1600"/>
+                    </a:p>
+                  </a:txBody>
+                  <a:tcPr/>
+                </a:tc>
+                <a:tc>
+                  <a:txBody>
+                    <a:bodyPr/>
+                    <a:lstStyle/>
+                    <a:p>
+                      <a:pPr algn="ctr" latinLnBrk="1"/>
+                      <a:r>
+                        <a:rPr lang="en-US" altLang="ko-KR" sz="1600" smtClean="0"/>
+                        <a:t>O</a:t>
+                      </a:r>
+                      <a:endParaRPr lang="ko-KR" altLang="en-US" sz="1600"/>
+                    </a:p>
+                  </a:txBody>
+                  <a:tcPr/>
+                </a:tc>
+                <a:tc>
+                  <a:txBody>
+                    <a:bodyPr/>
+                    <a:lstStyle/>
+                    <a:p>
+                      <a:pPr latinLnBrk="1"/>
+                      <a:endParaRPr lang="ko-KR" altLang="en-US" sz="1600"/>
+                    </a:p>
+                  </a:txBody>
+                  <a:tcPr/>
+                </a:tc>
+                <a:extLst>
+                  <a:ext uri="{0D108BD9-81ED-4DB2-BD59-A6C34878D82A}">
+                    <a16:rowId xmlns:a16="http://schemas.microsoft.com/office/drawing/2014/main" val="1696937111"/>
+                  </a:ext>
+                </a:extLst>
+              </a:tr>
+            </a:tbl>
+          </a:graphicData>
+        </a:graphic>
+      </p:graphicFrame>
+    </p:spTree>
+    <p:extLst>
+      <p:ext uri="{BB962C8B-B14F-4D97-AF65-F5344CB8AC3E}">
+        <p14:creationId xmlns:p14="http://schemas.microsoft.com/office/powerpoint/2010/main" val="2036201384"/>
+      </p:ext>
+    </p:extLst>
+  </p:cSld>
+  <p:clrMapOvr>
+    <a:masterClrMapping/>
+  </p:clrMapOvr>
+</p:sld>
+</file>
+
+<file path=ppt/slides/slide4.xml><?xml version="1.0" encoding="utf-8"?>
+<p:sld xmlns:a="http://schemas.openxmlformats.org/drawingml/2006/main" xmlns:r="http://schemas.openxmlformats.org/officeDocument/2006/relationships" xmlns:p="http://schemas.openxmlformats.org/presentationml/2006/main">
+  <p:cSld>
+    <p:spTree>
+      <p:nvGrpSpPr>
+        <p:cNvPr id="1" name=""/>
+        <p:cNvGrpSpPr/>
+        <p:nvPr/>
+      </p:nvGrpSpPr>
+      <p:grpSpPr>
+        <a:xfrm>
+          <a:off x="0" y="0"/>
+          <a:ext cx="0" cy="0"/>
+          <a:chOff x="0" y="0"/>
+          <a:chExt cx="0" cy="0"/>
+        </a:xfrm>
+      </p:grpSpPr>
+      <p:sp>
+        <p:nvSpPr>
+          <p:cNvPr id="2" name="제목 1"/>
+          <p:cNvSpPr>
+            <a:spLocks noGrp="1"/>
+          </p:cNvSpPr>
+          <p:nvPr>
+            <p:ph type="title"/>
+          </p:nvPr>
+        </p:nvSpPr>
         <p:spPr/>
         <p:txBody>
           <a:bodyPr/>
@@ -3948,7 +5742,105 @@
 </p:sld>
 </file>
 
-<file path=ppt/slides/slide3.xml><?xml version="1.0" encoding="utf-8"?>
+<file path=ppt/slides/slide5.xml><?xml version="1.0" encoding="utf-8"?>
+<p:sld xmlns:a="http://schemas.openxmlformats.org/drawingml/2006/main" xmlns:r="http://schemas.openxmlformats.org/officeDocument/2006/relationships" xmlns:p="http://schemas.openxmlformats.org/presentationml/2006/main">
+  <p:cSld>
+    <p:spTree>
+      <p:nvGrpSpPr>
+        <p:cNvPr id="1" name=""/>
+        <p:cNvGrpSpPr/>
+        <p:nvPr/>
+      </p:nvGrpSpPr>
+      <p:grpSpPr>
+        <a:xfrm>
+          <a:off x="0" y="0"/>
+          <a:ext cx="0" cy="0"/>
+          <a:chOff x="0" y="0"/>
+          <a:chExt cx="0" cy="0"/>
+        </a:xfrm>
+      </p:grpSpPr>
+      <p:sp>
+        <p:nvSpPr>
+          <p:cNvPr id="2" name="제목 1"/>
+          <p:cNvSpPr>
+            <a:spLocks noGrp="1"/>
+          </p:cNvSpPr>
+          <p:nvPr>
+            <p:ph type="title"/>
+          </p:nvPr>
+        </p:nvSpPr>
+        <p:spPr/>
+        <p:txBody>
+          <a:bodyPr/>
+          <a:lstStyle/>
+          <a:p>
+            <a:r>
+              <a:rPr lang="en-US" altLang="ko-KR"/>
+              <a:t>NiFi </a:t>
+            </a:r>
+            <a:r>
+              <a:rPr lang="en-US" altLang="ko-KR" smtClean="0"/>
+              <a:t>Architecture</a:t>
+            </a:r>
+            <a:endParaRPr lang="ko-KR" altLang="en-US"/>
+          </a:p>
+        </p:txBody>
+      </p:sp>
+      <p:pic>
+        <p:nvPicPr>
+          <p:cNvPr id="1026" name="Picture 2" descr="NiFi Architecture Diagram"/>
+          <p:cNvPicPr>
+            <a:picLocks noChangeAspect="1" noChangeArrowheads="1"/>
+          </p:cNvPicPr>
+          <p:nvPr/>
+        </p:nvPicPr>
+        <p:blipFill>
+          <a:blip r:embed="rId2">
+            <a:extLst>
+              <a:ext uri="{28A0092B-C50C-407E-A947-70E740481C1C}">
+                <a14:useLocalDpi xmlns:a14="http://schemas.microsoft.com/office/drawing/2010/main" val="0"/>
+              </a:ext>
+            </a:extLst>
+          </a:blip>
+          <a:srcRect/>
+          <a:stretch>
+            <a:fillRect/>
+          </a:stretch>
+        </p:blipFill>
+        <p:spPr bwMode="auto">
+          <a:xfrm>
+            <a:off x="1476375" y="1508789"/>
+            <a:ext cx="9239250" cy="4857751"/>
+          </a:xfrm>
+          <a:prstGeom prst="rect">
+            <a:avLst/>
+          </a:prstGeom>
+          <a:noFill/>
+          <a:extLst>
+            <a:ext uri="{909E8E84-426E-40DD-AFC4-6F175D3DCCD1}">
+              <a14:hiddenFill xmlns:a14="http://schemas.microsoft.com/office/drawing/2010/main">
+                <a:solidFill>
+                  <a:srgbClr val="FFFFFF"/>
+                </a:solidFill>
+              </a14:hiddenFill>
+            </a:ext>
+          </a:extLst>
+        </p:spPr>
+      </p:pic>
+    </p:spTree>
+    <p:extLst>
+      <p:ext uri="{BB962C8B-B14F-4D97-AF65-F5344CB8AC3E}">
+        <p14:creationId xmlns:p14="http://schemas.microsoft.com/office/powerpoint/2010/main" val="3892638181"/>
+      </p:ext>
+    </p:extLst>
+  </p:cSld>
+  <p:clrMapOvr>
+    <a:masterClrMapping/>
+  </p:clrMapOvr>
+</p:sld>
+</file>
+
+<file path=ppt/slides/slide6.xml><?xml version="1.0" encoding="utf-8"?>
 <p:sld xmlns:a="http://schemas.openxmlformats.org/drawingml/2006/main" xmlns:r="http://schemas.openxmlformats.org/officeDocument/2006/relationships" xmlns:p="http://schemas.openxmlformats.org/presentationml/2006/main">
   <p:cSld>
     <p:spTree>
@@ -4034,7 +5926,7 @@
 </p:sld>
 </file>
 
-<file path=ppt/slides/slide4.xml><?xml version="1.0" encoding="utf-8"?>
+<file path=ppt/slides/slide7.xml><?xml version="1.0" encoding="utf-8"?>
 <p:sld xmlns:a="http://schemas.openxmlformats.org/drawingml/2006/main" xmlns:r="http://schemas.openxmlformats.org/officeDocument/2006/relationships" xmlns:p="http://schemas.openxmlformats.org/presentationml/2006/main">
   <p:cSld>
     <p:spTree>
@@ -4182,11 +6074,7 @@
             </a:r>
             <a:r>
               <a:rPr lang="en-US" altLang="ko-KR"/>
-              <a:t>: Table </a:t>
-            </a:r>
-            <a:r>
-              <a:rPr lang="en-US" altLang="ko-KR"/>
-              <a:t>Layout </a:t>
+              <a:t>: Table Layout </a:t>
             </a:r>
             <a:r>
               <a:rPr lang="en-US" altLang="ko-KR" smtClean="0"/>

</xml_diff>

<commit_message>
kafka connect script 추가
</commit_message>
<xml_diff>
--- a/db2db_구조.pptx
+++ b/db2db_구조.pptx
@@ -6,12 +6,13 @@
   </p:sldMasterIdLst>
   <p:sldIdLst>
     <p:sldId id="256" r:id="rId2"/>
-    <p:sldId id="260" r:id="rId3"/>
-    <p:sldId id="261" r:id="rId4"/>
-    <p:sldId id="257" r:id="rId5"/>
-    <p:sldId id="262" r:id="rId6"/>
-    <p:sldId id="258" r:id="rId7"/>
-    <p:sldId id="259" r:id="rId8"/>
+    <p:sldId id="263" r:id="rId3"/>
+    <p:sldId id="260" r:id="rId4"/>
+    <p:sldId id="261" r:id="rId5"/>
+    <p:sldId id="257" r:id="rId6"/>
+    <p:sldId id="262" r:id="rId7"/>
+    <p:sldId id="258" r:id="rId8"/>
+    <p:sldId id="259" r:id="rId9"/>
   </p:sldIdLst>
   <p:sldSz cx="12192000" cy="6858000"/>
   <p:notesSz cx="6858000" cy="9144000"/>
@@ -249,7 +250,7 @@
           <a:p>
             <a:fld id="{810557F9-1F21-47B8-A6D4-D5A2F4A22EB4}" type="datetimeFigureOut">
               <a:rPr lang="ko-KR" altLang="en-US" smtClean="0"/>
-              <a:t>2020-02-28</a:t>
+              <a:t>2020-03-04</a:t>
             </a:fld>
             <a:endParaRPr lang="ko-KR" altLang="en-US"/>
           </a:p>
@@ -419,7 +420,7 @@
           <a:p>
             <a:fld id="{810557F9-1F21-47B8-A6D4-D5A2F4A22EB4}" type="datetimeFigureOut">
               <a:rPr lang="ko-KR" altLang="en-US" smtClean="0"/>
-              <a:t>2020-02-28</a:t>
+              <a:t>2020-03-04</a:t>
             </a:fld>
             <a:endParaRPr lang="ko-KR" altLang="en-US"/>
           </a:p>
@@ -599,7 +600,7 @@
           <a:p>
             <a:fld id="{810557F9-1F21-47B8-A6D4-D5A2F4A22EB4}" type="datetimeFigureOut">
               <a:rPr lang="ko-KR" altLang="en-US" smtClean="0"/>
-              <a:t>2020-02-28</a:t>
+              <a:t>2020-03-04</a:t>
             </a:fld>
             <a:endParaRPr lang="ko-KR" altLang="en-US"/>
           </a:p>
@@ -769,7 +770,7 @@
           <a:p>
             <a:fld id="{810557F9-1F21-47B8-A6D4-D5A2F4A22EB4}" type="datetimeFigureOut">
               <a:rPr lang="ko-KR" altLang="en-US" smtClean="0"/>
-              <a:t>2020-02-28</a:t>
+              <a:t>2020-03-04</a:t>
             </a:fld>
             <a:endParaRPr lang="ko-KR" altLang="en-US"/>
           </a:p>
@@ -1015,7 +1016,7 @@
           <a:p>
             <a:fld id="{810557F9-1F21-47B8-A6D4-D5A2F4A22EB4}" type="datetimeFigureOut">
               <a:rPr lang="ko-KR" altLang="en-US" smtClean="0"/>
-              <a:t>2020-02-28</a:t>
+              <a:t>2020-03-04</a:t>
             </a:fld>
             <a:endParaRPr lang="ko-KR" altLang="en-US"/>
           </a:p>
@@ -1247,7 +1248,7 @@
           <a:p>
             <a:fld id="{810557F9-1F21-47B8-A6D4-D5A2F4A22EB4}" type="datetimeFigureOut">
               <a:rPr lang="ko-KR" altLang="en-US" smtClean="0"/>
-              <a:t>2020-02-28</a:t>
+              <a:t>2020-03-04</a:t>
             </a:fld>
             <a:endParaRPr lang="ko-KR" altLang="en-US"/>
           </a:p>
@@ -1614,7 +1615,7 @@
           <a:p>
             <a:fld id="{810557F9-1F21-47B8-A6D4-D5A2F4A22EB4}" type="datetimeFigureOut">
               <a:rPr lang="ko-KR" altLang="en-US" smtClean="0"/>
-              <a:t>2020-02-28</a:t>
+              <a:t>2020-03-04</a:t>
             </a:fld>
             <a:endParaRPr lang="ko-KR" altLang="en-US"/>
           </a:p>
@@ -1732,7 +1733,7 @@
           <a:p>
             <a:fld id="{810557F9-1F21-47B8-A6D4-D5A2F4A22EB4}" type="datetimeFigureOut">
               <a:rPr lang="ko-KR" altLang="en-US" smtClean="0"/>
-              <a:t>2020-02-28</a:t>
+              <a:t>2020-03-04</a:t>
             </a:fld>
             <a:endParaRPr lang="ko-KR" altLang="en-US"/>
           </a:p>
@@ -1827,7 +1828,7 @@
           <a:p>
             <a:fld id="{810557F9-1F21-47B8-A6D4-D5A2F4A22EB4}" type="datetimeFigureOut">
               <a:rPr lang="ko-KR" altLang="en-US" smtClean="0"/>
-              <a:t>2020-02-28</a:t>
+              <a:t>2020-03-04</a:t>
             </a:fld>
             <a:endParaRPr lang="ko-KR" altLang="en-US"/>
           </a:p>
@@ -2104,7 +2105,7 @@
           <a:p>
             <a:fld id="{810557F9-1F21-47B8-A6D4-D5A2F4A22EB4}" type="datetimeFigureOut">
               <a:rPr lang="ko-KR" altLang="en-US" smtClean="0"/>
-              <a:t>2020-02-28</a:t>
+              <a:t>2020-03-04</a:t>
             </a:fld>
             <a:endParaRPr lang="ko-KR" altLang="en-US"/>
           </a:p>
@@ -2357,7 +2358,7 @@
           <a:p>
             <a:fld id="{810557F9-1F21-47B8-A6D4-D5A2F4A22EB4}" type="datetimeFigureOut">
               <a:rPr lang="ko-KR" altLang="en-US" smtClean="0"/>
-              <a:t>2020-02-28</a:t>
+              <a:t>2020-03-04</a:t>
             </a:fld>
             <a:endParaRPr lang="ko-KR" altLang="en-US"/>
           </a:p>
@@ -2570,7 +2571,7 @@
           <a:p>
             <a:fld id="{810557F9-1F21-47B8-A6D4-D5A2F4A22EB4}" type="datetimeFigureOut">
               <a:rPr lang="ko-KR" altLang="en-US" smtClean="0"/>
-              <a:t>2020-02-28</a:t>
+              <a:t>2020-03-04</a:t>
             </a:fld>
             <a:endParaRPr lang="ko-KR" altLang="en-US"/>
           </a:p>
@@ -3064,6 +3065,94 @@
             <p:ph type="title"/>
           </p:nvPr>
         </p:nvSpPr>
+        <p:spPr/>
+        <p:txBody>
+          <a:bodyPr/>
+          <a:lstStyle/>
+          <a:p>
+            <a:r>
+              <a:rPr lang="en-US" altLang="ko-KR" smtClean="0"/>
+              <a:t>Container </a:t>
+            </a:r>
+            <a:r>
+              <a:rPr lang="ko-KR" altLang="en-US" smtClean="0"/>
+              <a:t>기반 </a:t>
+            </a:r>
+            <a:r>
+              <a:rPr lang="en-US" altLang="ko-KR" smtClean="0"/>
+              <a:t>Kafka-connect </a:t>
+            </a:r>
+            <a:r>
+              <a:rPr lang="ko-KR" altLang="en-US" smtClean="0"/>
+              <a:t>작업 서버 구성</a:t>
+            </a:r>
+            <a:endParaRPr lang="ko-KR" altLang="en-US"/>
+          </a:p>
+        </p:txBody>
+      </p:sp>
+      <p:sp>
+        <p:nvSpPr>
+          <p:cNvPr id="3" name="내용 개체 틀 2"/>
+          <p:cNvSpPr>
+            <a:spLocks noGrp="1"/>
+          </p:cNvSpPr>
+          <p:nvPr>
+            <p:ph idx="1"/>
+          </p:nvPr>
+        </p:nvSpPr>
+        <p:spPr/>
+        <p:txBody>
+          <a:bodyPr/>
+          <a:lstStyle/>
+          <a:p>
+            <a:r>
+              <a:rPr lang="en-US" altLang="ko-KR" smtClean="0"/>
+              <a:t>Docker file</a:t>
+            </a:r>
+            <a:endParaRPr lang="ko-KR" altLang="en-US"/>
+          </a:p>
+        </p:txBody>
+      </p:sp>
+    </p:spTree>
+    <p:extLst>
+      <p:ext uri="{BB962C8B-B14F-4D97-AF65-F5344CB8AC3E}">
+        <p14:creationId xmlns:p14="http://schemas.microsoft.com/office/powerpoint/2010/main" val="1795898820"/>
+      </p:ext>
+    </p:extLst>
+  </p:cSld>
+  <p:clrMapOvr>
+    <a:masterClrMapping/>
+  </p:clrMapOvr>
+</p:sld>
+</file>
+
+<file path=ppt/slides/slide3.xml><?xml version="1.0" encoding="utf-8"?>
+<p:sld xmlns:a="http://schemas.openxmlformats.org/drawingml/2006/main" xmlns:r="http://schemas.openxmlformats.org/officeDocument/2006/relationships" xmlns:p="http://schemas.openxmlformats.org/presentationml/2006/main">
+  <p:cSld>
+    <p:spTree>
+      <p:nvGrpSpPr>
+        <p:cNvPr id="1" name=""/>
+        <p:cNvGrpSpPr/>
+        <p:nvPr/>
+      </p:nvGrpSpPr>
+      <p:grpSpPr>
+        <a:xfrm>
+          <a:off x="0" y="0"/>
+          <a:ext cx="0" cy="0"/>
+          <a:chOff x="0" y="0"/>
+          <a:chExt cx="0" cy="0"/>
+        </a:xfrm>
+      </p:grpSpPr>
+      <p:sp>
+        <p:nvSpPr>
+          <p:cNvPr id="2" name="제목 1"/>
+          <p:cNvSpPr>
+            <a:spLocks noGrp="1"/>
+          </p:cNvSpPr>
+          <p:nvPr>
+            <p:ph type="title"/>
+          </p:nvPr>
+        </p:nvSpPr>
         <p:spPr>
           <a:xfrm>
             <a:off x="838200" y="365126"/>
@@ -3833,7 +3922,7 @@
 </p:sld>
 </file>
 
-<file path=ppt/slides/slide3.xml><?xml version="1.0" encoding="utf-8"?>
+<file path=ppt/slides/slide4.xml><?xml version="1.0" encoding="utf-8"?>
 <p:sld xmlns:a="http://schemas.openxmlformats.org/drawingml/2006/main" xmlns:r="http://schemas.openxmlformats.org/officeDocument/2006/relationships" xmlns:p="http://schemas.openxmlformats.org/presentationml/2006/main">
   <p:cSld>
     <p:spTree>
@@ -4828,7 +4917,7 @@
 </p:sld>
 </file>
 
-<file path=ppt/slides/slide4.xml><?xml version="1.0" encoding="utf-8"?>
+<file path=ppt/slides/slide5.xml><?xml version="1.0" encoding="utf-8"?>
 <p:sld xmlns:a="http://schemas.openxmlformats.org/drawingml/2006/main" xmlns:r="http://schemas.openxmlformats.org/officeDocument/2006/relationships" xmlns:p="http://schemas.openxmlformats.org/presentationml/2006/main">
   <p:cSld>
     <p:spTree>
@@ -5742,7 +5831,7 @@
 </p:sld>
 </file>
 
-<file path=ppt/slides/slide5.xml><?xml version="1.0" encoding="utf-8"?>
+<file path=ppt/slides/slide6.xml><?xml version="1.0" encoding="utf-8"?>
 <p:sld xmlns:a="http://schemas.openxmlformats.org/drawingml/2006/main" xmlns:r="http://schemas.openxmlformats.org/officeDocument/2006/relationships" xmlns:p="http://schemas.openxmlformats.org/presentationml/2006/main">
   <p:cSld>
     <p:spTree>
@@ -5840,7 +5929,7 @@
 </p:sld>
 </file>
 
-<file path=ppt/slides/slide6.xml><?xml version="1.0" encoding="utf-8"?>
+<file path=ppt/slides/slide7.xml><?xml version="1.0" encoding="utf-8"?>
 <p:sld xmlns:a="http://schemas.openxmlformats.org/drawingml/2006/main" xmlns:r="http://schemas.openxmlformats.org/officeDocument/2006/relationships" xmlns:p="http://schemas.openxmlformats.org/presentationml/2006/main">
   <p:cSld>
     <p:spTree>
@@ -5926,7 +6015,7 @@
 </p:sld>
 </file>
 
-<file path=ppt/slides/slide7.xml><?xml version="1.0" encoding="utf-8"?>
+<file path=ppt/slides/slide8.xml><?xml version="1.0" encoding="utf-8"?>
 <p:sld xmlns:a="http://schemas.openxmlformats.org/drawingml/2006/main" xmlns:r="http://schemas.openxmlformats.org/officeDocument/2006/relationships" xmlns:p="http://schemas.openxmlformats.org/presentationml/2006/main">
   <p:cSld>
     <p:spTree>

</xml_diff>